<commit_message>
added presentation in jpg format
</commit_message>
<xml_diff>
--- a/Project 3 - El Clasico de Reddit.pptx
+++ b/Project 3 - El Clasico de Reddit.pptx
@@ -8,14 +8,15 @@
     <p:sldId id="256" r:id="rId2"/>
     <p:sldId id="257" r:id="rId3"/>
     <p:sldId id="266" r:id="rId4"/>
-    <p:sldId id="271" r:id="rId5"/>
-    <p:sldId id="268" r:id="rId6"/>
-    <p:sldId id="272" r:id="rId7"/>
-    <p:sldId id="262" r:id="rId8"/>
-    <p:sldId id="260" r:id="rId9"/>
-    <p:sldId id="267" r:id="rId10"/>
-    <p:sldId id="261" r:id="rId11"/>
-    <p:sldId id="269" r:id="rId12"/>
+    <p:sldId id="273" r:id="rId5"/>
+    <p:sldId id="271" r:id="rId6"/>
+    <p:sldId id="268" r:id="rId7"/>
+    <p:sldId id="272" r:id="rId8"/>
+    <p:sldId id="262" r:id="rId9"/>
+    <p:sldId id="260" r:id="rId10"/>
+    <p:sldId id="274" r:id="rId11"/>
+    <p:sldId id="261" r:id="rId12"/>
+    <p:sldId id="269" r:id="rId13"/>
   </p:sldIdLst>
   <p:sldSz cx="9144000" cy="6858000" type="screen4x3"/>
   <p:notesSz cx="6858000" cy="9144000"/>
@@ -3287,12 +3288,14 @@
         </p:nvSpPr>
         <p:spPr/>
         <p:txBody>
-          <a:bodyPr/>
-          <a:lstStyle/>
-          <a:p>
-            <a:r>
-              <a:rPr lang="en-US" dirty="0" smtClean="0"/>
-              <a:t>Random Forest</a:t>
+          <a:bodyPr>
+            <a:normAutofit/>
+          </a:bodyPr>
+          <a:lstStyle/>
+          <a:p>
+            <a:r>
+              <a:rPr lang="en-US" dirty="0" smtClean="0"/>
+              <a:t>Forest and Trees</a:t>
             </a:r>
             <a:endParaRPr lang="en-US" dirty="0"/>
           </a:p>
@@ -3310,132 +3313,153 @@
         </p:nvSpPr>
         <p:spPr/>
         <p:txBody>
-          <a:bodyPr/>
-          <a:lstStyle/>
-          <a:p>
-            <a:r>
-              <a:rPr lang="en-US" dirty="0" smtClean="0"/>
-              <a:t>With Player’s &amp; Clubs Names</a:t>
-            </a:r>
+          <a:bodyPr>
+            <a:normAutofit fontScale="92500" lnSpcReduction="10000"/>
+          </a:bodyPr>
+          <a:lstStyle/>
+          <a:p>
+            <a:r>
+              <a:rPr lang="en-US" dirty="0"/>
+              <a:t>Without or With Player &amp; Team stop words</a:t>
+            </a:r>
+          </a:p>
+          <a:p>
+            <a:pPr marL="0" indent="0">
+              <a:buNone/>
+            </a:pPr>
+            <a:endParaRPr lang="en-US" dirty="0" smtClean="0"/>
+          </a:p>
+          <a:p>
+            <a:r>
+              <a:rPr lang="en-US" dirty="0" err="1" smtClean="0"/>
+              <a:t>RandomForestClassifier</a:t>
+            </a:r>
+            <a:r>
+              <a:rPr lang="en-US" dirty="0" smtClean="0"/>
+              <a:t> </a:t>
+            </a:r>
+            <a:endParaRPr lang="en-US" dirty="0" smtClean="0"/>
           </a:p>
           <a:p>
             <a:pPr lvl="1"/>
             <a:r>
               <a:rPr lang="en-US" dirty="0" smtClean="0"/>
-              <a:t>Grid Search CV </a:t>
+              <a:t>Best </a:t>
             </a:r>
             <a:r>
               <a:rPr lang="en-US" dirty="0"/>
-              <a:t>best score: </a:t>
-            </a:r>
-            <a:r>
-              <a:rPr lang="en-US" dirty="0" smtClean="0"/>
-              <a:t>0.766</a:t>
-            </a:r>
-            <a:endParaRPr lang="en-US" dirty="0"/>
+              <a:t>c</a:t>
+            </a:r>
+            <a:r>
+              <a:rPr lang="en-US" dirty="0" smtClean="0"/>
+              <a:t>v scores: </a:t>
+            </a:r>
           </a:p>
           <a:p>
             <a:pPr lvl="2"/>
             <a:r>
               <a:rPr lang="en-US" dirty="0" smtClean="0"/>
+              <a:t>Keeping stop words in model, Train</a:t>
+            </a:r>
+            <a:r>
+              <a:rPr lang="en-US" dirty="0" smtClean="0"/>
+              <a:t>: 0.732 </a:t>
+            </a:r>
+            <a:r>
+              <a:rPr lang="en-US" dirty="0"/>
+              <a:t>| Test: 0.699 </a:t>
+            </a:r>
+          </a:p>
+          <a:p>
+            <a:pPr lvl="2"/>
+            <a:r>
+              <a:rPr lang="en-US" dirty="0" smtClean="0"/>
+              <a:t>Taking stop </a:t>
+            </a:r>
+            <a:r>
+              <a:rPr lang="en-US" dirty="0"/>
+              <a:t>words </a:t>
+            </a:r>
+            <a:r>
+              <a:rPr lang="en-US" dirty="0" smtClean="0"/>
+              <a:t>out of model, Train</a:t>
+            </a:r>
+            <a:r>
+              <a:rPr lang="en-US" dirty="0" smtClean="0"/>
+              <a:t>: </a:t>
+            </a:r>
+            <a:r>
+              <a:rPr lang="en-US" dirty="0" smtClean="0"/>
+              <a:t>0.655 </a:t>
+            </a:r>
+            <a:r>
+              <a:rPr lang="en-US" dirty="0" smtClean="0"/>
+              <a:t>|</a:t>
+            </a:r>
+            <a:r>
+              <a:rPr lang="en-US" dirty="0" smtClean="0"/>
+              <a:t>Test</a:t>
+            </a:r>
+            <a:r>
+              <a:rPr lang="en-US" dirty="0" smtClean="0"/>
+              <a:t>: </a:t>
+            </a:r>
+            <a:r>
+              <a:rPr lang="en-US" dirty="0" smtClean="0"/>
+              <a:t>0.608 </a:t>
+            </a:r>
+          </a:p>
+          <a:p>
+            <a:r>
+              <a:rPr lang="en-US" dirty="0" err="1" smtClean="0"/>
+              <a:t>ExtraTreesClassifier</a:t>
+            </a:r>
+            <a:endParaRPr lang="en-US" dirty="0" smtClean="0"/>
+          </a:p>
+          <a:p>
+            <a:pPr lvl="1"/>
+            <a:r>
+              <a:rPr lang="en-US" dirty="0" smtClean="0"/>
               <a:t>Best </a:t>
             </a:r>
             <a:r>
-              <a:rPr lang="en-US" dirty="0" err="1"/>
-              <a:t>Params</a:t>
-            </a:r>
+              <a:rPr lang="en-US" dirty="0" smtClean="0"/>
+              <a:t>cv scores: </a:t>
+            </a:r>
+            <a:endParaRPr lang="en-US" dirty="0" smtClean="0"/>
+          </a:p>
+          <a:p>
+            <a:pPr lvl="2"/>
             <a:r>
               <a:rPr lang="en-US" dirty="0"/>
-              <a:t>: {'</a:t>
-            </a:r>
-            <a:r>
-              <a:rPr lang="en-US" dirty="0" err="1"/>
-              <a:t>max_depth</a:t>
+              <a:t>Keeping stop words in model, Train: </a:t>
+            </a:r>
+            <a:r>
+              <a:rPr lang="en-US" dirty="0" smtClean="0"/>
+              <a:t>0.743 </a:t>
             </a:r>
             <a:r>
               <a:rPr lang="en-US" dirty="0"/>
-              <a:t>': None, '</a:t>
-            </a:r>
-            <a:r>
-              <a:rPr lang="en-US" dirty="0" err="1"/>
-              <a:t>max_features</a:t>
-            </a:r>
+              <a:t>| Test: 0.699 </a:t>
+            </a:r>
+          </a:p>
+          <a:p>
+            <a:pPr lvl="2"/>
             <a:r>
               <a:rPr lang="en-US" dirty="0"/>
-              <a:t>': 'auto', '</a:t>
-            </a:r>
-            <a:r>
-              <a:rPr lang="en-US" dirty="0" err="1"/>
-              <a:t>n_estimators</a:t>
+              <a:t>Taking stop words out of model, Train: </a:t>
+            </a:r>
+            <a:r>
+              <a:rPr lang="en-US" dirty="0" smtClean="0"/>
+              <a:t>0.664 </a:t>
             </a:r>
             <a:r>
               <a:rPr lang="en-US" dirty="0"/>
-              <a:t>': 43}</a:t>
-            </a:r>
-            <a:endParaRPr lang="en-US" dirty="0" smtClean="0"/>
-          </a:p>
-          <a:p>
-            <a:r>
-              <a:rPr lang="en-US" dirty="0" smtClean="0"/>
-              <a:t>Without Player’s &amp; Clubs Names </a:t>
-            </a:r>
-          </a:p>
-          <a:p>
-            <a:pPr lvl="1"/>
-            <a:r>
-              <a:rPr lang="en-US" dirty="0" smtClean="0"/>
-              <a:t>Grid </a:t>
-            </a:r>
-            <a:r>
-              <a:rPr lang="en-US" dirty="0"/>
-              <a:t>Search CV best score: </a:t>
-            </a:r>
-            <a:r>
-              <a:rPr lang="en-US" dirty="0" smtClean="0"/>
-              <a:t>0.685</a:t>
-            </a:r>
-          </a:p>
-          <a:p>
-            <a:pPr lvl="2"/>
-            <a:r>
-              <a:rPr lang="en-US" dirty="0" smtClean="0"/>
-              <a:t>Best </a:t>
-            </a:r>
-            <a:r>
-              <a:rPr lang="en-US" dirty="0" err="1"/>
-              <a:t>Params</a:t>
-            </a:r>
-            <a:r>
-              <a:rPr lang="en-US" dirty="0"/>
-              <a:t>: {'</a:t>
-            </a:r>
-            <a:r>
-              <a:rPr lang="en-US" dirty="0" err="1"/>
-              <a:t>max_depth</a:t>
-            </a:r>
-            <a:r>
-              <a:rPr lang="en-US" dirty="0"/>
-              <a:t>': None, '</a:t>
-            </a:r>
-            <a:r>
-              <a:rPr lang="en-US" dirty="0" err="1"/>
-              <a:t>max_features</a:t>
-            </a:r>
-            <a:r>
-              <a:rPr lang="en-US" dirty="0"/>
-              <a:t>': 'log2', '</a:t>
-            </a:r>
-            <a:r>
-              <a:rPr lang="en-US" dirty="0" err="1"/>
-              <a:t>n_estimators</a:t>
-            </a:r>
-            <a:r>
-              <a:rPr lang="en-US" dirty="0"/>
-              <a:t>': </a:t>
-            </a:r>
-            <a:r>
-              <a:rPr lang="en-US" dirty="0" smtClean="0"/>
-              <a:t>45}</a:t>
+              <a:t>|Test: </a:t>
+            </a:r>
+            <a:r>
+              <a:rPr lang="en-US" dirty="0" smtClean="0"/>
+              <a:t>0.604 </a:t>
             </a:r>
             <a:endParaRPr lang="en-US" dirty="0"/>
           </a:p>
@@ -3444,7 +3468,7 @@
     </p:spTree>
     <p:extLst>
       <p:ext uri="{BB962C8B-B14F-4D97-AF65-F5344CB8AC3E}">
-        <p14:creationId xmlns:p14="http://schemas.microsoft.com/office/powerpoint/2010/main" val="30245042"/>
+        <p14:creationId xmlns:p14="http://schemas.microsoft.com/office/powerpoint/2010/main" val="1973110270"/>
       </p:ext>
     </p:extLst>
   </p:cSld>
@@ -3495,7 +3519,210 @@
           <a:p>
             <a:r>
               <a:rPr lang="en-US" dirty="0" smtClean="0"/>
-              <a:t>Conclusions</a:t>
+              <a:t>Random Forest</a:t>
+            </a:r>
+            <a:endParaRPr lang="en-US" dirty="0"/>
+          </a:p>
+        </p:txBody>
+      </p:sp>
+      <p:sp>
+        <p:nvSpPr>
+          <p:cNvPr id="3" name="Content Placeholder 2"/>
+          <p:cNvSpPr>
+            <a:spLocks noGrp="1"/>
+          </p:cNvSpPr>
+          <p:nvPr>
+            <p:ph idx="1"/>
+          </p:nvPr>
+        </p:nvSpPr>
+        <p:spPr/>
+        <p:txBody>
+          <a:bodyPr/>
+          <a:lstStyle/>
+          <a:p>
+            <a:r>
+              <a:rPr lang="en-US" dirty="0" smtClean="0"/>
+              <a:t>With Player’s &amp; Clubs Names</a:t>
+            </a:r>
+          </a:p>
+          <a:p>
+            <a:pPr lvl="1"/>
+            <a:r>
+              <a:rPr lang="en-US" dirty="0" smtClean="0"/>
+              <a:t>Grid Search CV </a:t>
+            </a:r>
+            <a:r>
+              <a:rPr lang="en-US" dirty="0"/>
+              <a:t>best score: </a:t>
+            </a:r>
+            <a:r>
+              <a:rPr lang="en-US" dirty="0" smtClean="0"/>
+              <a:t>0.766</a:t>
+            </a:r>
+            <a:endParaRPr lang="en-US" dirty="0"/>
+          </a:p>
+          <a:p>
+            <a:pPr lvl="2"/>
+            <a:r>
+              <a:rPr lang="en-US" dirty="0" smtClean="0"/>
+              <a:t>Best </a:t>
+            </a:r>
+            <a:r>
+              <a:rPr lang="en-US" dirty="0" err="1"/>
+              <a:t>Params</a:t>
+            </a:r>
+            <a:r>
+              <a:rPr lang="en-US" dirty="0"/>
+              <a:t>: {'</a:t>
+            </a:r>
+            <a:r>
+              <a:rPr lang="en-US" dirty="0" err="1"/>
+              <a:t>max_depth</a:t>
+            </a:r>
+            <a:r>
+              <a:rPr lang="en-US" dirty="0"/>
+              <a:t>': None, '</a:t>
+            </a:r>
+            <a:r>
+              <a:rPr lang="en-US" dirty="0" err="1"/>
+              <a:t>max_features</a:t>
+            </a:r>
+            <a:r>
+              <a:rPr lang="en-US" dirty="0"/>
+              <a:t>': 'auto', '</a:t>
+            </a:r>
+            <a:r>
+              <a:rPr lang="en-US" dirty="0" err="1"/>
+              <a:t>n_estimators</a:t>
+            </a:r>
+            <a:r>
+              <a:rPr lang="en-US" dirty="0"/>
+              <a:t>': 43}</a:t>
+            </a:r>
+            <a:endParaRPr lang="en-US" dirty="0" smtClean="0"/>
+          </a:p>
+          <a:p>
+            <a:r>
+              <a:rPr lang="en-US" dirty="0" smtClean="0"/>
+              <a:t>Without Player’s &amp; Clubs Names </a:t>
+            </a:r>
+          </a:p>
+          <a:p>
+            <a:pPr lvl="1"/>
+            <a:r>
+              <a:rPr lang="en-US" dirty="0" smtClean="0"/>
+              <a:t>Grid </a:t>
+            </a:r>
+            <a:r>
+              <a:rPr lang="en-US" dirty="0"/>
+              <a:t>Search CV best score: </a:t>
+            </a:r>
+            <a:r>
+              <a:rPr lang="en-US" dirty="0" smtClean="0"/>
+              <a:t>0.685</a:t>
+            </a:r>
+          </a:p>
+          <a:p>
+            <a:pPr lvl="2"/>
+            <a:r>
+              <a:rPr lang="en-US" dirty="0" smtClean="0"/>
+              <a:t>Best </a:t>
+            </a:r>
+            <a:r>
+              <a:rPr lang="en-US" dirty="0" err="1"/>
+              <a:t>Params</a:t>
+            </a:r>
+            <a:r>
+              <a:rPr lang="en-US" dirty="0"/>
+              <a:t>: {'</a:t>
+            </a:r>
+            <a:r>
+              <a:rPr lang="en-US" dirty="0" err="1"/>
+              <a:t>max_depth</a:t>
+            </a:r>
+            <a:r>
+              <a:rPr lang="en-US" dirty="0"/>
+              <a:t>': None, '</a:t>
+            </a:r>
+            <a:r>
+              <a:rPr lang="en-US" dirty="0" err="1"/>
+              <a:t>max_features</a:t>
+            </a:r>
+            <a:r>
+              <a:rPr lang="en-US" dirty="0"/>
+              <a:t>': 'log2', '</a:t>
+            </a:r>
+            <a:r>
+              <a:rPr lang="en-US" dirty="0" err="1"/>
+              <a:t>n_estimators</a:t>
+            </a:r>
+            <a:r>
+              <a:rPr lang="en-US" dirty="0"/>
+              <a:t>': </a:t>
+            </a:r>
+            <a:r>
+              <a:rPr lang="en-US" dirty="0" smtClean="0"/>
+              <a:t>45}</a:t>
+            </a:r>
+            <a:endParaRPr lang="en-US" dirty="0"/>
+          </a:p>
+        </p:txBody>
+      </p:sp>
+    </p:spTree>
+    <p:extLst>
+      <p:ext uri="{BB962C8B-B14F-4D97-AF65-F5344CB8AC3E}">
+        <p14:creationId xmlns:p14="http://schemas.microsoft.com/office/powerpoint/2010/main" val="30245042"/>
+      </p:ext>
+    </p:extLst>
+  </p:cSld>
+  <p:clrMapOvr>
+    <a:masterClrMapping/>
+  </p:clrMapOvr>
+  <p:timing>
+    <p:tnLst>
+      <p:par>
+        <p:cTn xmlns:p14="http://schemas.microsoft.com/office/powerpoint/2010/main" id="1" dur="indefinite" restart="never" nodeType="tmRoot"/>
+      </p:par>
+    </p:tnLst>
+  </p:timing>
+</p:sld>
+</file>
+
+<file path=ppt/slides/slide12.xml><?xml version="1.0" encoding="utf-8"?>
+<p:sld xmlns:a="http://schemas.openxmlformats.org/drawingml/2006/main" xmlns:r="http://schemas.openxmlformats.org/officeDocument/2006/relationships" xmlns:p="http://schemas.openxmlformats.org/presentationml/2006/main">
+  <p:cSld>
+    <p:spTree>
+      <p:nvGrpSpPr>
+        <p:cNvPr id="1" name=""/>
+        <p:cNvGrpSpPr/>
+        <p:nvPr/>
+      </p:nvGrpSpPr>
+      <p:grpSpPr>
+        <a:xfrm>
+          <a:off x="0" y="0"/>
+          <a:ext cx="0" cy="0"/>
+          <a:chOff x="0" y="0"/>
+          <a:chExt cx="0" cy="0"/>
+        </a:xfrm>
+      </p:grpSpPr>
+      <p:sp>
+        <p:nvSpPr>
+          <p:cNvPr id="2" name="Title 1"/>
+          <p:cNvSpPr>
+            <a:spLocks noGrp="1"/>
+          </p:cNvSpPr>
+          <p:nvPr>
+            <p:ph type="title"/>
+          </p:nvPr>
+        </p:nvSpPr>
+        <p:spPr/>
+        <p:txBody>
+          <a:bodyPr/>
+          <a:lstStyle/>
+          <a:p>
+            <a:r>
+              <a:rPr lang="en-US" dirty="0" smtClean="0"/>
+              <a:t>Conclusions &amp; Takeaways</a:t>
             </a:r>
             <a:endParaRPr lang="en-US" dirty="0"/>
           </a:p>
@@ -3522,7 +3749,15 @@
             </a:pPr>
             <a:r>
               <a:rPr lang="en-US" dirty="0" smtClean="0"/>
-              <a:t>Top feature is players names</a:t>
+              <a:t>Top feature is </a:t>
+            </a:r>
+            <a:r>
+              <a:rPr lang="en-US" dirty="0" smtClean="0"/>
+              <a:t>clearly players </a:t>
+            </a:r>
+            <a:r>
+              <a:rPr lang="en-US" dirty="0" smtClean="0"/>
+              <a:t>names</a:t>
             </a:r>
           </a:p>
           <a:p>
@@ -3542,33 +3777,27 @@
             </a:pPr>
             <a:r>
               <a:rPr lang="en-US" dirty="0" smtClean="0"/>
-              <a:t>Regardless due to the nature of comments being so randomly similar within the two </a:t>
-            </a:r>
+              <a:t>To improve:</a:t>
+            </a:r>
+            <a:endParaRPr lang="en-US" dirty="0" smtClean="0"/>
+          </a:p>
+          <a:p>
+            <a:pPr marL="742950" lvl="2" indent="-342900"/>
             <a:r>
               <a:rPr lang="en-US" dirty="0" err="1" smtClean="0"/>
-              <a:t>subreddits</a:t>
-            </a:r>
-            <a:endParaRPr lang="en-US" dirty="0"/>
-          </a:p>
-          <a:p>
-            <a:pPr marL="342900" lvl="1" indent="-342900">
-              <a:buFont typeface="Arial"/>
-              <a:buChar char="•"/>
-            </a:pPr>
-            <a:r>
-              <a:rPr lang="en-US" dirty="0" smtClean="0"/>
-              <a:t>To do:</a:t>
-            </a:r>
-          </a:p>
-          <a:p>
-            <a:pPr marL="742950" lvl="2" indent="-342900"/>
-            <a:r>
-              <a:rPr lang="en-US" dirty="0" smtClean="0"/>
-              <a:t>To </a:t>
-            </a:r>
-            <a:r>
-              <a:rPr lang="en-US" dirty="0" smtClean="0"/>
-              <a:t>do more model parameters </a:t>
+              <a:t>Gridsearch</a:t>
+            </a:r>
+            <a:r>
+              <a:rPr lang="en-US" dirty="0" smtClean="0"/>
+              <a:t> over more </a:t>
+            </a:r>
+            <a:r>
+              <a:rPr lang="en-US" dirty="0" smtClean="0"/>
+              <a:t>model </a:t>
+            </a:r>
+            <a:r>
+              <a:rPr lang="en-US" dirty="0" smtClean="0"/>
+              <a:t>parameters </a:t>
             </a:r>
           </a:p>
           <a:p>
@@ -3846,6 +4075,140 @@
           <a:p>
             <a:r>
               <a:rPr lang="en-US" dirty="0" smtClean="0"/>
+              <a:t>Examples of </a:t>
+            </a:r>
+            <a:r>
+              <a:rPr lang="en-US" dirty="0" err="1" smtClean="0"/>
+              <a:t>S</a:t>
+            </a:r>
+            <a:r>
+              <a:rPr lang="en-US" dirty="0" err="1" smtClean="0"/>
+              <a:t>ubreddits</a:t>
+            </a:r>
+            <a:r>
+              <a:rPr lang="en-US" dirty="0" smtClean="0"/>
+              <a:t>’ Data</a:t>
+            </a:r>
+            <a:endParaRPr lang="en-US" dirty="0"/>
+          </a:p>
+        </p:txBody>
+      </p:sp>
+      <p:pic>
+        <p:nvPicPr>
+          <p:cNvPr id="3" name="Picture 2" descr="example_barca.png"/>
+          <p:cNvPicPr>
+            <a:picLocks noChangeAspect="1"/>
+          </p:cNvPicPr>
+          <p:nvPr/>
+        </p:nvPicPr>
+        <p:blipFill>
+          <a:blip r:embed="rId2">
+            <a:extLst>
+              <a:ext uri="{28A0092B-C50C-407E-A947-70E740481C1C}">
+                <a14:useLocalDpi xmlns:a14="http://schemas.microsoft.com/office/drawing/2010/main" val="0"/>
+              </a:ext>
+            </a:extLst>
+          </a:blip>
+          <a:stretch>
+            <a:fillRect/>
+          </a:stretch>
+        </p:blipFill>
+        <p:spPr>
+          <a:xfrm>
+            <a:off x="875895" y="1878476"/>
+            <a:ext cx="7595160" cy="1884005"/>
+          </a:xfrm>
+          <a:prstGeom prst="rect">
+            <a:avLst/>
+          </a:prstGeom>
+        </p:spPr>
+      </p:pic>
+      <p:pic>
+        <p:nvPicPr>
+          <p:cNvPr id="5" name="Picture 4" descr="example_realmadrid.png"/>
+          <p:cNvPicPr>
+            <a:picLocks noChangeAspect="1"/>
+          </p:cNvPicPr>
+          <p:nvPr/>
+        </p:nvPicPr>
+        <p:blipFill>
+          <a:blip r:embed="rId3">
+            <a:extLst>
+              <a:ext uri="{28A0092B-C50C-407E-A947-70E740481C1C}">
+                <a14:useLocalDpi xmlns:a14="http://schemas.microsoft.com/office/drawing/2010/main" val="0"/>
+              </a:ext>
+            </a:extLst>
+          </a:blip>
+          <a:stretch>
+            <a:fillRect/>
+          </a:stretch>
+        </p:blipFill>
+        <p:spPr>
+          <a:xfrm>
+            <a:off x="875895" y="4136234"/>
+            <a:ext cx="7595160" cy="1881836"/>
+          </a:xfrm>
+          <a:prstGeom prst="rect">
+            <a:avLst/>
+          </a:prstGeom>
+        </p:spPr>
+      </p:pic>
+    </p:spTree>
+    <p:extLst>
+      <p:ext uri="{BB962C8B-B14F-4D97-AF65-F5344CB8AC3E}">
+        <p14:creationId xmlns:p14="http://schemas.microsoft.com/office/powerpoint/2010/main" val="2396387005"/>
+      </p:ext>
+    </p:extLst>
+  </p:cSld>
+  <p:clrMapOvr>
+    <a:masterClrMapping/>
+  </p:clrMapOvr>
+  <p:timing>
+    <p:tnLst>
+      <p:par>
+        <p:cTn xmlns:p14="http://schemas.microsoft.com/office/powerpoint/2010/main" id="1" dur="indefinite" restart="never" nodeType="tmRoot"/>
+      </p:par>
+    </p:tnLst>
+  </p:timing>
+</p:sld>
+</file>
+
+<file path=ppt/slides/slide4.xml><?xml version="1.0" encoding="utf-8"?>
+<p:sld xmlns:a="http://schemas.openxmlformats.org/drawingml/2006/main" xmlns:r="http://schemas.openxmlformats.org/officeDocument/2006/relationships" xmlns:p="http://schemas.openxmlformats.org/presentationml/2006/main">
+  <p:cSld>
+    <p:spTree>
+      <p:nvGrpSpPr>
+        <p:cNvPr id="1" name=""/>
+        <p:cNvGrpSpPr/>
+        <p:nvPr/>
+      </p:nvGrpSpPr>
+      <p:grpSpPr>
+        <a:xfrm>
+          <a:off x="0" y="0"/>
+          <a:ext cx="0" cy="0"/>
+          <a:chOff x="0" y="0"/>
+          <a:chExt cx="0" cy="0"/>
+        </a:xfrm>
+      </p:grpSpPr>
+      <p:sp>
+        <p:nvSpPr>
+          <p:cNvPr id="2" name="Title 1"/>
+          <p:cNvSpPr>
+            <a:spLocks noGrp="1"/>
+          </p:cNvSpPr>
+          <p:nvPr>
+            <p:ph type="title"/>
+          </p:nvPr>
+        </p:nvSpPr>
+        <p:spPr/>
+        <p:txBody>
+          <a:bodyPr>
+            <a:normAutofit/>
+          </a:bodyPr>
+          <a:lstStyle/>
+          <a:p>
+            <a:r>
+              <a:rPr lang="en-US" dirty="0" smtClean="0"/>
               <a:t>Features with Players / Teams</a:t>
             </a:r>
             <a:endParaRPr lang="en-US" dirty="0"/>
@@ -3885,7 +4248,7 @@
     </p:spTree>
     <p:extLst>
       <p:ext uri="{BB962C8B-B14F-4D97-AF65-F5344CB8AC3E}">
-        <p14:creationId xmlns:p14="http://schemas.microsoft.com/office/powerpoint/2010/main" val="2396387005"/>
+        <p14:creationId xmlns:p14="http://schemas.microsoft.com/office/powerpoint/2010/main" val="923547335"/>
       </p:ext>
     </p:extLst>
   </p:cSld>
@@ -3902,7 +4265,7 @@
 </p:sld>
 </file>
 
-<file path=ppt/slides/slide4.xml><?xml version="1.0" encoding="utf-8"?>
+<file path=ppt/slides/slide5.xml><?xml version="1.0" encoding="utf-8"?>
 <p:sld xmlns:a="http://schemas.openxmlformats.org/drawingml/2006/main" xmlns:r="http://schemas.openxmlformats.org/officeDocument/2006/relationships" xmlns:p="http://schemas.openxmlformats.org/presentationml/2006/main">
   <p:cSld>
     <p:spTree>
@@ -3992,7 +4355,7 @@
 </p:sld>
 </file>
 
-<file path=ppt/slides/slide5.xml><?xml version="1.0" encoding="utf-8"?>
+<file path=ppt/slides/slide6.xml><?xml version="1.0" encoding="utf-8"?>
 <p:sld xmlns:a="http://schemas.openxmlformats.org/drawingml/2006/main" xmlns:r="http://schemas.openxmlformats.org/officeDocument/2006/relationships" xmlns:p="http://schemas.openxmlformats.org/presentationml/2006/main">
   <p:cSld>
     <p:bg>
@@ -4222,7 +4585,7 @@
 </p:sld>
 </file>
 
-<file path=ppt/slides/slide6.xml><?xml version="1.0" encoding="utf-8"?>
+<file path=ppt/slides/slide7.xml><?xml version="1.0" encoding="utf-8"?>
 <p:sld xmlns:a="http://schemas.openxmlformats.org/drawingml/2006/main" xmlns:r="http://schemas.openxmlformats.org/officeDocument/2006/relationships" xmlns:p="http://schemas.openxmlformats.org/presentationml/2006/main">
   <p:cSld>
     <p:spTree>
@@ -4312,7 +4675,7 @@
 </p:sld>
 </file>
 
-<file path=ppt/slides/slide7.xml><?xml version="1.0" encoding="utf-8"?>
+<file path=ppt/slides/slide8.xml><?xml version="1.0" encoding="utf-8"?>
 <p:sld xmlns:a="http://schemas.openxmlformats.org/drawingml/2006/main" xmlns:r="http://schemas.openxmlformats.org/officeDocument/2006/relationships" xmlns:p="http://schemas.openxmlformats.org/presentationml/2006/main">
   <p:cSld>
     <p:spTree>
@@ -4469,7 +4832,7 @@
 </p:sld>
 </file>
 
-<file path=ppt/slides/slide8.xml><?xml version="1.0" encoding="utf-8"?>
+<file path=ppt/slides/slide9.xml><?xml version="1.0" encoding="utf-8"?>
 <p:sld xmlns:a="http://schemas.openxmlformats.org/drawingml/2006/main" xmlns:r="http://schemas.openxmlformats.org/officeDocument/2006/relationships" xmlns:p="http://schemas.openxmlformats.org/presentationml/2006/main">
   <p:cSld>
     <p:spTree>
@@ -4679,160 +5042,6 @@
     <p:extLst>
       <p:ext uri="{BB962C8B-B14F-4D97-AF65-F5344CB8AC3E}">
         <p14:creationId xmlns:p14="http://schemas.microsoft.com/office/powerpoint/2010/main" val="1085746728"/>
-      </p:ext>
-    </p:extLst>
-  </p:cSld>
-  <p:clrMapOvr>
-    <a:masterClrMapping/>
-  </p:clrMapOvr>
-  <p:timing>
-    <p:tnLst>
-      <p:par>
-        <p:cTn xmlns:p14="http://schemas.microsoft.com/office/powerpoint/2010/main" id="1" dur="indefinite" restart="never" nodeType="tmRoot"/>
-      </p:par>
-    </p:tnLst>
-  </p:timing>
-</p:sld>
-</file>
-
-<file path=ppt/slides/slide9.xml><?xml version="1.0" encoding="utf-8"?>
-<p:sld xmlns:a="http://schemas.openxmlformats.org/drawingml/2006/main" xmlns:r="http://schemas.openxmlformats.org/officeDocument/2006/relationships" xmlns:p="http://schemas.openxmlformats.org/presentationml/2006/main">
-  <p:cSld>
-    <p:spTree>
-      <p:nvGrpSpPr>
-        <p:cNvPr id="1" name=""/>
-        <p:cNvGrpSpPr/>
-        <p:nvPr/>
-      </p:nvGrpSpPr>
-      <p:grpSpPr>
-        <a:xfrm>
-          <a:off x="0" y="0"/>
-          <a:ext cx="0" cy="0"/>
-          <a:chOff x="0" y="0"/>
-          <a:chExt cx="0" cy="0"/>
-        </a:xfrm>
-      </p:grpSpPr>
-      <p:sp>
-        <p:nvSpPr>
-          <p:cNvPr id="2" name="Title 1"/>
-          <p:cNvSpPr>
-            <a:spLocks noGrp="1"/>
-          </p:cNvSpPr>
-          <p:nvPr>
-            <p:ph type="title"/>
-          </p:nvPr>
-        </p:nvSpPr>
-        <p:spPr/>
-        <p:txBody>
-          <a:bodyPr>
-            <a:normAutofit/>
-          </a:bodyPr>
-          <a:lstStyle/>
-          <a:p>
-            <a:r>
-              <a:rPr lang="en-US" dirty="0" smtClean="0"/>
-              <a:t>Forest and Trees</a:t>
-            </a:r>
-            <a:endParaRPr lang="en-US" dirty="0"/>
-          </a:p>
-        </p:txBody>
-      </p:sp>
-      <p:sp>
-        <p:nvSpPr>
-          <p:cNvPr id="3" name="Content Placeholder 2"/>
-          <p:cNvSpPr>
-            <a:spLocks noGrp="1"/>
-          </p:cNvSpPr>
-          <p:nvPr>
-            <p:ph idx="1"/>
-          </p:nvPr>
-        </p:nvSpPr>
-        <p:spPr/>
-        <p:txBody>
-          <a:bodyPr>
-            <a:normAutofit lnSpcReduction="10000"/>
-          </a:bodyPr>
-          <a:lstStyle/>
-          <a:p>
-            <a:r>
-              <a:rPr lang="en-US" dirty="0" err="1" smtClean="0"/>
-              <a:t>RandomForestClassifier</a:t>
-            </a:r>
-            <a:r>
-              <a:rPr lang="en-US" dirty="0" smtClean="0"/>
-              <a:t> </a:t>
-            </a:r>
-          </a:p>
-          <a:p>
-            <a:pPr lvl="1"/>
-            <a:r>
-              <a:rPr lang="en-US" dirty="0" smtClean="0"/>
-              <a:t>Best </a:t>
-            </a:r>
-            <a:r>
-              <a:rPr lang="en-US" dirty="0"/>
-              <a:t>c</a:t>
-            </a:r>
-            <a:r>
-              <a:rPr lang="en-US" dirty="0" smtClean="0"/>
-              <a:t>v scores: </a:t>
-            </a:r>
-          </a:p>
-          <a:p>
-            <a:pPr lvl="2"/>
-            <a:r>
-              <a:rPr lang="en-US" dirty="0" smtClean="0"/>
-              <a:t>Train: 0.732 without | 0.655 with </a:t>
-            </a:r>
-          </a:p>
-          <a:p>
-            <a:pPr lvl="2"/>
-            <a:r>
-              <a:rPr lang="en-US" dirty="0" smtClean="0"/>
-              <a:t>Test: 0.699 without |0.608 with</a:t>
-            </a:r>
-          </a:p>
-          <a:p>
-            <a:r>
-              <a:rPr lang="en-US" dirty="0" err="1" smtClean="0"/>
-              <a:t>ExtraTreesClassifier</a:t>
-            </a:r>
-            <a:endParaRPr lang="en-US" dirty="0" smtClean="0"/>
-          </a:p>
-          <a:p>
-            <a:pPr lvl="1"/>
-            <a:r>
-              <a:rPr lang="en-US" dirty="0" smtClean="0"/>
-              <a:t>Best cv scores: </a:t>
-            </a:r>
-          </a:p>
-          <a:p>
-            <a:pPr lvl="2"/>
-            <a:r>
-              <a:rPr lang="en-US" dirty="0" smtClean="0"/>
-              <a:t>Train: 0.743 without|0.664 with </a:t>
-            </a:r>
-          </a:p>
-          <a:p>
-            <a:pPr lvl="2"/>
-            <a:r>
-              <a:rPr lang="en-US" dirty="0" smtClean="0"/>
-              <a:t>Test: 0.699 without|0.604 with</a:t>
-            </a:r>
-          </a:p>
-          <a:p>
-            <a:r>
-              <a:rPr lang="en-US" dirty="0" smtClean="0"/>
-              <a:t>Without or With Player &amp; Team stop words</a:t>
-            </a:r>
-            <a:endParaRPr lang="en-US" dirty="0"/>
-          </a:p>
-        </p:txBody>
-      </p:sp>
-    </p:spTree>
-    <p:extLst>
-      <p:ext uri="{BB962C8B-B14F-4D97-AF65-F5344CB8AC3E}">
-        <p14:creationId xmlns:p14="http://schemas.microsoft.com/office/powerpoint/2010/main" val="3445792333"/>
       </p:ext>
     </p:extLst>
   </p:cSld>

</xml_diff>